<commit_message>
Update Organization Cybersecurity Policy and Executive Summary RCoon.pptx
</commit_message>
<xml_diff>
--- a/CYB-650/Topic 8/Organization Cybersecurity Policy and Executive Summary RCoon.pptx
+++ b/CYB-650/Topic 8/Organization Cybersecurity Policy and Executive Summary RCoon.pptx
@@ -220,7 +220,7 @@
           <a:p>
             <a:fld id="{3F00BCFC-AFFD-334C-A183-6116BAFDF92B}" type="datetimeFigureOut">
               <a:rPr lang="en-US" smtClean="0"/>
-              <a:t>8/25/2025</a:t>
+              <a:t>8/26/2025</a:t>
             </a:fld>
             <a:endParaRPr lang="en-US" dirty="0"/>
           </a:p>
@@ -19317,6 +19317,36 @@
           </a:p>
         </p:txBody>
       </p:sp>
+      <p:pic>
+        <p:nvPicPr>
+          <p:cNvPr id="6" name="Picture 5" descr="A diagram of a computer network&#10;&#10;AI-generated content may be incorrect.">
+            <a:extLst>
+              <a:ext uri="{FF2B5EF4-FFF2-40B4-BE49-F238E27FC236}">
+                <a16:creationId xmlns:a16="http://schemas.microsoft.com/office/drawing/2014/main" id="{403A3299-B3DB-E285-26EE-33B8FFC3E77F}"/>
+              </a:ext>
+            </a:extLst>
+          </p:cNvPr>
+          <p:cNvPicPr>
+            <a:picLocks noChangeAspect="1"/>
+          </p:cNvPicPr>
+          <p:nvPr/>
+        </p:nvPicPr>
+        <p:blipFill>
+          <a:blip r:embed="rId2"/>
+          <a:stretch>
+            <a:fillRect/>
+          </a:stretch>
+        </p:blipFill>
+        <p:spPr>
+          <a:xfrm>
+            <a:off x="1411796" y="1412424"/>
+            <a:ext cx="9929812" cy="5390024"/>
+          </a:xfrm>
+          <a:prstGeom prst="rect">
+            <a:avLst/>
+          </a:prstGeom>
+        </p:spPr>
+      </p:pic>
     </p:spTree>
     <p:extLst>
       <p:ext uri="{BB962C8B-B14F-4D97-AF65-F5344CB8AC3E}">
@@ -20401,15 +20431,6 @@
 </file>
 
 <file path=customXml/item1.xml><?xml version="1.0" encoding="utf-8"?>
-<?mso-contentType ?>
-<FormTemplates xmlns="http://schemas.microsoft.com/sharepoint/v3/contenttype/forms">
-  <Display>DocumentLibraryForm</Display>
-  <Edit>DocumentLibraryForm</Edit>
-  <New>DocumentLibraryForm</New>
-</FormTemplates>
-</file>
-
-<file path=customXml/item2.xml><?xml version="1.0" encoding="utf-8"?>
 <ct:contentTypeSchema xmlns:ct="http://schemas.microsoft.com/office/2006/metadata/contentType" xmlns:ma="http://schemas.microsoft.com/office/2006/metadata/properties/metaAttributes" ct:_="" ma:_="" ma:contentTypeName="Document" ma:contentTypeID="0x01010079F111ED35F8CC479449609E8A0923A6" ma:contentTypeVersion="25" ma:contentTypeDescription="Create a new document." ma:contentTypeScope="" ma:versionID="e02306daf00165b375dc6a58966960be">
   <xsd:schema xmlns:xsd="http://www.w3.org/2001/XMLSchema" xmlns:xs="http://www.w3.org/2001/XMLSchema" xmlns:p="http://schemas.microsoft.com/office/2006/metadata/properties" xmlns:ns1="http://schemas.microsoft.com/sharepoint/v3" xmlns:ns2="71af3243-3dd4-4a8d-8c0d-dd76da1f02a5" xmlns:ns3="16c05727-aa75-4e4a-9b5f-8a80a1165891" xmlns:ns4="230e9df3-be65-4c73-a93b-d1236ebd677e" targetNamespace="http://schemas.microsoft.com/office/2006/metadata/properties" ma:root="true" ma:fieldsID="df88fb76bf5f555224557953949c1ec9" ns1:_="" ns2:_="" ns3:_="" ns4:_="">
     <xsd:import namespace="http://schemas.microsoft.com/sharepoint/v3"/>
@@ -20703,6 +20724,15 @@
 </ct:contentTypeSchema>
 </file>
 
+<file path=customXml/item2.xml><?xml version="1.0" encoding="utf-8"?>
+<?mso-contentType ?>
+<FormTemplates xmlns="http://schemas.microsoft.com/sharepoint/v3/contenttype/forms">
+  <Display>DocumentLibraryForm</Display>
+  <Edit>DocumentLibraryForm</Edit>
+  <New>DocumentLibraryForm</New>
+</FormTemplates>
+</file>
+
 <file path=customXml/item3.xml><?xml version="1.0" encoding="utf-8"?>
 <p:properties xmlns:p="http://schemas.microsoft.com/office/2006/metadata/properties" xmlns:xsi="http://www.w3.org/2001/XMLSchema-instance" xmlns:pc="http://schemas.microsoft.com/office/infopath/2007/PartnerControls">
   <documentManagement>
@@ -20724,14 +20754,6 @@
 </file>
 
 <file path=customXml/itemProps1.xml><?xml version="1.0" encoding="utf-8"?>
-<ds:datastoreItem xmlns:ds="http://schemas.openxmlformats.org/officeDocument/2006/customXml" ds:itemID="{43C4A95C-9007-4EA6-944B-306B6F2A0100}">
-  <ds:schemaRefs>
-    <ds:schemaRef ds:uri="http://schemas.microsoft.com/sharepoint/v3/contenttype/forms"/>
-  </ds:schemaRefs>
-</ds:datastoreItem>
-</file>
-
-<file path=customXml/itemProps2.xml><?xml version="1.0" encoding="utf-8"?>
 <ds:datastoreItem xmlns:ds="http://schemas.openxmlformats.org/officeDocument/2006/customXml" ds:itemID="{62CF8670-35D1-4455-AC7A-762B7388BE22}">
   <ds:schemaRefs>
     <ds:schemaRef ds:uri="http://schemas.microsoft.com/office/2006/metadata/contentType"/>
@@ -20752,6 +20774,14 @@
 </ds:datastoreItem>
 </file>
 
+<file path=customXml/itemProps2.xml><?xml version="1.0" encoding="utf-8"?>
+<ds:datastoreItem xmlns:ds="http://schemas.openxmlformats.org/officeDocument/2006/customXml" ds:itemID="{43C4A95C-9007-4EA6-944B-306B6F2A0100}">
+  <ds:schemaRefs>
+    <ds:schemaRef ds:uri="http://schemas.microsoft.com/sharepoint/v3/contenttype/forms"/>
+  </ds:schemaRefs>
+</ds:datastoreItem>
+</file>
+
 <file path=customXml/itemProps3.xml><?xml version="1.0" encoding="utf-8"?>
 <ds:datastoreItem xmlns:ds="http://schemas.openxmlformats.org/officeDocument/2006/customXml" ds:itemID="{EA4A3FD6-E6BF-490E-B6B4-6A011394B0EB}">
   <ds:schemaRefs>

</xml_diff>